<commit_message>
Made praesentation look good on mac
</commit_message>
<xml_diff>
--- a/Praesentation.pptx
+++ b/Praesentation.pptx
@@ -19403,7 +19403,7 @@
         </p:nvSpPr>
         <p:spPr>
           <a:xfrm>
-            <a:off x="6098650" y="1690689"/>
+            <a:off x="6603152" y="1690689"/>
             <a:ext cx="5255150" cy="4486274"/>
           </a:xfrm>
         </p:spPr>
@@ -19493,7 +19493,7 @@
         <p:spPr>
           <a:xfrm>
             <a:off x="838200" y="1690688"/>
-            <a:ext cx="5260450" cy="4154984"/>
+            <a:ext cx="5751786" cy="4154984"/>
           </a:xfrm>
           <a:prstGeom prst="rect">
             <a:avLst/>

</xml_diff>